<commit_message>
ZF-4527 - Include slide notes in indexer (Zend_Search_Lucene_Document_Pptx)
git-svn-id: http://framework.zend.com/svn/framework/standard/trunk@11825 44c647ce-9c0f-0410-b52a-842ac1e357ba
</commit_message>
<xml_diff>
--- a/tests/Zend/Search/Lucene/_openXmlDocuments/test.pptx
+++ b/tests/Zend/Search/Lucene/_openXmlDocuments/test.pptx
@@ -4,6 +4,9 @@
   <p:sldMasterIdLst>
     <p:sldMasterId id="2147483648" r:id="rId1"/>
   </p:sldMasterIdLst>
+  <p:notesMasterIdLst>
+    <p:notesMasterId r:id="rId5"/>
+  </p:notesMasterIdLst>
   <p:sldIdLst>
     <p:sldId id="256" r:id="rId2"/>
     <p:sldId id="257" r:id="rId3"/>
@@ -109,6 +112,614 @@
 </p:presentation>
 </file>
 
+<file path=ppt/notesMasters/notesMaster1.xml><?xml version="1.0" encoding="utf-8"?>
+<p:notesMaster xmlns:a="http://schemas.openxmlformats.org/drawingml/2006/main" xmlns:r="http://schemas.openxmlformats.org/officeDocument/2006/relationships" xmlns:p="http://schemas.openxmlformats.org/presentationml/2006/main">
+  <p:cSld>
+    <p:bg>
+      <p:bgRef idx="1001">
+        <a:schemeClr val="bg1"/>
+      </p:bgRef>
+    </p:bg>
+    <p:spTree>
+      <p:nvGrpSpPr>
+        <p:cNvPr id="1" name=""/>
+        <p:cNvGrpSpPr/>
+        <p:nvPr/>
+      </p:nvGrpSpPr>
+      <p:grpSpPr>
+        <a:xfrm>
+          <a:off x="0" y="0"/>
+          <a:ext cx="0" cy="0"/>
+          <a:chOff x="0" y="0"/>
+          <a:chExt cx="0" cy="0"/>
+        </a:xfrm>
+      </p:grpSpPr>
+      <p:sp>
+        <p:nvSpPr>
+          <p:cNvPr id="2" name="Header Placeholder 1"/>
+          <p:cNvSpPr>
+            <a:spLocks noGrp="1"/>
+          </p:cNvSpPr>
+          <p:nvPr>
+            <p:ph type="hdr" sz="quarter"/>
+          </p:nvPr>
+        </p:nvSpPr>
+        <p:spPr>
+          <a:xfrm>
+            <a:off x="0" y="0"/>
+            <a:ext cx="2971800" cy="457200"/>
+          </a:xfrm>
+          <a:prstGeom prst="rect">
+            <a:avLst/>
+          </a:prstGeom>
+        </p:spPr>
+        <p:txBody>
+          <a:bodyPr vert="horz" lIns="91440" tIns="45720" rIns="91440" bIns="45720" rtlCol="0"/>
+          <a:lstStyle>
+            <a:lvl1pPr algn="l">
+              <a:defRPr sz="1200"/>
+            </a:lvl1pPr>
+          </a:lstStyle>
+          <a:p>
+            <a:endParaRPr lang="nl-BE"/>
+          </a:p>
+        </p:txBody>
+      </p:sp>
+      <p:sp>
+        <p:nvSpPr>
+          <p:cNvPr id="3" name="Date Placeholder 2"/>
+          <p:cNvSpPr>
+            <a:spLocks noGrp="1"/>
+          </p:cNvSpPr>
+          <p:nvPr>
+            <p:ph type="dt" idx="1"/>
+          </p:nvPr>
+        </p:nvSpPr>
+        <p:spPr>
+          <a:xfrm>
+            <a:off x="3884613" y="0"/>
+            <a:ext cx="2971800" cy="457200"/>
+          </a:xfrm>
+          <a:prstGeom prst="rect">
+            <a:avLst/>
+          </a:prstGeom>
+        </p:spPr>
+        <p:txBody>
+          <a:bodyPr vert="horz" lIns="91440" tIns="45720" rIns="91440" bIns="45720" rtlCol="0"/>
+          <a:lstStyle>
+            <a:lvl1pPr algn="r">
+              <a:defRPr sz="1200"/>
+            </a:lvl1pPr>
+          </a:lstStyle>
+          <a:p>
+            <a:fld id="{4BBFE9F7-5FDD-40D8-B4B7-CDD14A4E3B16}" type="datetimeFigureOut">
+              <a:rPr lang="nl-BE" smtClean="0"/>
+              <a:t>9/10/2008</a:t>
+            </a:fld>
+            <a:endParaRPr lang="nl-BE"/>
+          </a:p>
+        </p:txBody>
+      </p:sp>
+      <p:sp>
+        <p:nvSpPr>
+          <p:cNvPr id="4" name="Slide Image Placeholder 3"/>
+          <p:cNvSpPr>
+            <a:spLocks noGrp="1" noRot="1" noChangeAspect="1"/>
+          </p:cNvSpPr>
+          <p:nvPr>
+            <p:ph type="sldImg" idx="2"/>
+          </p:nvPr>
+        </p:nvSpPr>
+        <p:spPr>
+          <a:xfrm>
+            <a:off x="1143000" y="685800"/>
+            <a:ext cx="4572000" cy="3429000"/>
+          </a:xfrm>
+          <a:prstGeom prst="rect">
+            <a:avLst/>
+          </a:prstGeom>
+          <a:noFill/>
+          <a:ln w="12700">
+            <a:solidFill>
+              <a:prstClr val="black"/>
+            </a:solidFill>
+          </a:ln>
+        </p:spPr>
+        <p:txBody>
+          <a:bodyPr vert="horz" lIns="91440" tIns="45720" rIns="91440" bIns="45720" rtlCol="0" anchor="ctr"/>
+          <a:lstStyle/>
+          <a:p>
+            <a:endParaRPr lang="nl-BE"/>
+          </a:p>
+        </p:txBody>
+      </p:sp>
+      <p:sp>
+        <p:nvSpPr>
+          <p:cNvPr id="5" name="Notes Placeholder 4"/>
+          <p:cNvSpPr>
+            <a:spLocks noGrp="1"/>
+          </p:cNvSpPr>
+          <p:nvPr>
+            <p:ph type="body" sz="quarter" idx="3"/>
+          </p:nvPr>
+        </p:nvSpPr>
+        <p:spPr>
+          <a:xfrm>
+            <a:off x="685800" y="4343400"/>
+            <a:ext cx="5486400" cy="4114800"/>
+          </a:xfrm>
+          <a:prstGeom prst="rect">
+            <a:avLst/>
+          </a:prstGeom>
+        </p:spPr>
+        <p:txBody>
+          <a:bodyPr vert="horz" lIns="91440" tIns="45720" rIns="91440" bIns="45720" rtlCol="0">
+            <a:normAutofit/>
+          </a:bodyPr>
+          <a:lstStyle/>
+          <a:p>
+            <a:pPr lvl="0"/>
+            <a:r>
+              <a:rPr lang="en-US" smtClean="0"/>
+              <a:t>Click to edit Master text styles</a:t>
+            </a:r>
+          </a:p>
+          <a:p>
+            <a:pPr lvl="1"/>
+            <a:r>
+              <a:rPr lang="en-US" smtClean="0"/>
+              <a:t>Second level</a:t>
+            </a:r>
+          </a:p>
+          <a:p>
+            <a:pPr lvl="2"/>
+            <a:r>
+              <a:rPr lang="en-US" smtClean="0"/>
+              <a:t>Third level</a:t>
+            </a:r>
+          </a:p>
+          <a:p>
+            <a:pPr lvl="3"/>
+            <a:r>
+              <a:rPr lang="en-US" smtClean="0"/>
+              <a:t>Fourth level</a:t>
+            </a:r>
+          </a:p>
+          <a:p>
+            <a:pPr lvl="4"/>
+            <a:r>
+              <a:rPr lang="en-US" smtClean="0"/>
+              <a:t>Fifth level</a:t>
+            </a:r>
+            <a:endParaRPr lang="nl-BE"/>
+          </a:p>
+        </p:txBody>
+      </p:sp>
+      <p:sp>
+        <p:nvSpPr>
+          <p:cNvPr id="6" name="Footer Placeholder 5"/>
+          <p:cNvSpPr>
+            <a:spLocks noGrp="1"/>
+          </p:cNvSpPr>
+          <p:nvPr>
+            <p:ph type="ftr" sz="quarter" idx="4"/>
+          </p:nvPr>
+        </p:nvSpPr>
+        <p:spPr>
+          <a:xfrm>
+            <a:off x="0" y="8685213"/>
+            <a:ext cx="2971800" cy="457200"/>
+          </a:xfrm>
+          <a:prstGeom prst="rect">
+            <a:avLst/>
+          </a:prstGeom>
+        </p:spPr>
+        <p:txBody>
+          <a:bodyPr vert="horz" lIns="91440" tIns="45720" rIns="91440" bIns="45720" rtlCol="0" anchor="b"/>
+          <a:lstStyle>
+            <a:lvl1pPr algn="l">
+              <a:defRPr sz="1200"/>
+            </a:lvl1pPr>
+          </a:lstStyle>
+          <a:p>
+            <a:endParaRPr lang="nl-BE"/>
+          </a:p>
+        </p:txBody>
+      </p:sp>
+      <p:sp>
+        <p:nvSpPr>
+          <p:cNvPr id="7" name="Slide Number Placeholder 6"/>
+          <p:cNvSpPr>
+            <a:spLocks noGrp="1"/>
+          </p:cNvSpPr>
+          <p:nvPr>
+            <p:ph type="sldNum" sz="quarter" idx="5"/>
+          </p:nvPr>
+        </p:nvSpPr>
+        <p:spPr>
+          <a:xfrm>
+            <a:off x="3884613" y="8685213"/>
+            <a:ext cx="2971800" cy="457200"/>
+          </a:xfrm>
+          <a:prstGeom prst="rect">
+            <a:avLst/>
+          </a:prstGeom>
+        </p:spPr>
+        <p:txBody>
+          <a:bodyPr vert="horz" lIns="91440" tIns="45720" rIns="91440" bIns="45720" rtlCol="0" anchor="b"/>
+          <a:lstStyle>
+            <a:lvl1pPr algn="r">
+              <a:defRPr sz="1200"/>
+            </a:lvl1pPr>
+          </a:lstStyle>
+          <a:p>
+            <a:fld id="{38FEDBC2-E4AF-4493-8E02-4010DC5B5CB7}" type="slidenum">
+              <a:rPr lang="nl-BE" smtClean="0"/>
+              <a:t>‹#›</a:t>
+            </a:fld>
+            <a:endParaRPr lang="nl-BE"/>
+          </a:p>
+        </p:txBody>
+      </p:sp>
+    </p:spTree>
+  </p:cSld>
+  <p:clrMap bg1="lt1" tx1="dk1" bg2="lt2" tx2="dk2" accent1="accent1" accent2="accent2" accent3="accent3" accent4="accent4" accent5="accent5" accent6="accent6" hlink="hlink" folHlink="folHlink"/>
+  <p:notesStyle>
+    <a:lvl1pPr marL="0" algn="l" defTabSz="914400" rtl="0" eaLnBrk="1" latinLnBrk="0" hangingPunct="1">
+      <a:defRPr sz="1200" kern="1200">
+        <a:solidFill>
+          <a:schemeClr val="tx1"/>
+        </a:solidFill>
+        <a:latin typeface="+mn-lt"/>
+        <a:ea typeface="+mn-ea"/>
+        <a:cs typeface="+mn-cs"/>
+      </a:defRPr>
+    </a:lvl1pPr>
+    <a:lvl2pPr marL="457200" algn="l" defTabSz="914400" rtl="0" eaLnBrk="1" latinLnBrk="0" hangingPunct="1">
+      <a:defRPr sz="1200" kern="1200">
+        <a:solidFill>
+          <a:schemeClr val="tx1"/>
+        </a:solidFill>
+        <a:latin typeface="+mn-lt"/>
+        <a:ea typeface="+mn-ea"/>
+        <a:cs typeface="+mn-cs"/>
+      </a:defRPr>
+    </a:lvl2pPr>
+    <a:lvl3pPr marL="914400" algn="l" defTabSz="914400" rtl="0" eaLnBrk="1" latinLnBrk="0" hangingPunct="1">
+      <a:defRPr sz="1200" kern="1200">
+        <a:solidFill>
+          <a:schemeClr val="tx1"/>
+        </a:solidFill>
+        <a:latin typeface="+mn-lt"/>
+        <a:ea typeface="+mn-ea"/>
+        <a:cs typeface="+mn-cs"/>
+      </a:defRPr>
+    </a:lvl3pPr>
+    <a:lvl4pPr marL="1371600" algn="l" defTabSz="914400" rtl="0" eaLnBrk="1" latinLnBrk="0" hangingPunct="1">
+      <a:defRPr sz="1200" kern="1200">
+        <a:solidFill>
+          <a:schemeClr val="tx1"/>
+        </a:solidFill>
+        <a:latin typeface="+mn-lt"/>
+        <a:ea typeface="+mn-ea"/>
+        <a:cs typeface="+mn-cs"/>
+      </a:defRPr>
+    </a:lvl4pPr>
+    <a:lvl5pPr marL="1828800" algn="l" defTabSz="914400" rtl="0" eaLnBrk="1" latinLnBrk="0" hangingPunct="1">
+      <a:defRPr sz="1200" kern="1200">
+        <a:solidFill>
+          <a:schemeClr val="tx1"/>
+        </a:solidFill>
+        <a:latin typeface="+mn-lt"/>
+        <a:ea typeface="+mn-ea"/>
+        <a:cs typeface="+mn-cs"/>
+      </a:defRPr>
+    </a:lvl5pPr>
+    <a:lvl6pPr marL="2286000" algn="l" defTabSz="914400" rtl="0" eaLnBrk="1" latinLnBrk="0" hangingPunct="1">
+      <a:defRPr sz="1200" kern="1200">
+        <a:solidFill>
+          <a:schemeClr val="tx1"/>
+        </a:solidFill>
+        <a:latin typeface="+mn-lt"/>
+        <a:ea typeface="+mn-ea"/>
+        <a:cs typeface="+mn-cs"/>
+      </a:defRPr>
+    </a:lvl6pPr>
+    <a:lvl7pPr marL="2743200" algn="l" defTabSz="914400" rtl="0" eaLnBrk="1" latinLnBrk="0" hangingPunct="1">
+      <a:defRPr sz="1200" kern="1200">
+        <a:solidFill>
+          <a:schemeClr val="tx1"/>
+        </a:solidFill>
+        <a:latin typeface="+mn-lt"/>
+        <a:ea typeface="+mn-ea"/>
+        <a:cs typeface="+mn-cs"/>
+      </a:defRPr>
+    </a:lvl7pPr>
+    <a:lvl8pPr marL="3200400" algn="l" defTabSz="914400" rtl="0" eaLnBrk="1" latinLnBrk="0" hangingPunct="1">
+      <a:defRPr sz="1200" kern="1200">
+        <a:solidFill>
+          <a:schemeClr val="tx1"/>
+        </a:solidFill>
+        <a:latin typeface="+mn-lt"/>
+        <a:ea typeface="+mn-ea"/>
+        <a:cs typeface="+mn-cs"/>
+      </a:defRPr>
+    </a:lvl8pPr>
+    <a:lvl9pPr marL="3657600" algn="l" defTabSz="914400" rtl="0" eaLnBrk="1" latinLnBrk="0" hangingPunct="1">
+      <a:defRPr sz="1200" kern="1200">
+        <a:solidFill>
+          <a:schemeClr val="tx1"/>
+        </a:solidFill>
+        <a:latin typeface="+mn-lt"/>
+        <a:ea typeface="+mn-ea"/>
+        <a:cs typeface="+mn-cs"/>
+      </a:defRPr>
+    </a:lvl9pPr>
+  </p:notesStyle>
+</p:notesMaster>
+</file>
+
+<file path=ppt/notesSlides/notesSlide1.xml><?xml version="1.0" encoding="utf-8"?>
+<p:notes xmlns:a="http://schemas.openxmlformats.org/drawingml/2006/main" xmlns:r="http://schemas.openxmlformats.org/officeDocument/2006/relationships" xmlns:p="http://schemas.openxmlformats.org/presentationml/2006/main">
+  <p:cSld>
+    <p:spTree>
+      <p:nvGrpSpPr>
+        <p:cNvPr id="1" name=""/>
+        <p:cNvGrpSpPr/>
+        <p:nvPr/>
+      </p:nvGrpSpPr>
+      <p:grpSpPr>
+        <a:xfrm>
+          <a:off x="0" y="0"/>
+          <a:ext cx="0" cy="0"/>
+          <a:chOff x="0" y="0"/>
+          <a:chExt cx="0" cy="0"/>
+        </a:xfrm>
+      </p:grpSpPr>
+      <p:sp>
+        <p:nvSpPr>
+          <p:cNvPr id="2" name="Slide Image Placeholder 1"/>
+          <p:cNvSpPr>
+            <a:spLocks noGrp="1" noRot="1" noChangeAspect="1"/>
+          </p:cNvSpPr>
+          <p:nvPr>
+            <p:ph type="sldImg"/>
+          </p:nvPr>
+        </p:nvSpPr>
+        <p:spPr/>
+      </p:sp>
+      <p:sp>
+        <p:nvSpPr>
+          <p:cNvPr id="3" name="Notes Placeholder 2"/>
+          <p:cNvSpPr>
+            <a:spLocks noGrp="1"/>
+          </p:cNvSpPr>
+          <p:nvPr>
+            <p:ph type="body" idx="1"/>
+          </p:nvPr>
+        </p:nvSpPr>
+        <p:spPr/>
+        <p:txBody>
+          <a:bodyPr>
+            <a:normAutofit/>
+          </a:bodyPr>
+          <a:lstStyle/>
+          <a:p>
+            <a:r>
+              <a:rPr lang="nl-BE" dirty="0" smtClean="0"/>
+              <a:t>The </a:t>
+            </a:r>
+            <a:r>
+              <a:rPr lang="nl-BE" dirty="0" err="1" smtClean="0"/>
+              <a:t>current</a:t>
+            </a:r>
+            <a:r>
+              <a:rPr lang="nl-BE" dirty="0" smtClean="0"/>
+              <a:t> </a:t>
+            </a:r>
+            <a:r>
+              <a:rPr lang="nl-BE" dirty="0" err="1" smtClean="0"/>
+              <a:t>slide</a:t>
+            </a:r>
+            <a:r>
+              <a:rPr lang="nl-BE" dirty="0" smtClean="0"/>
+              <a:t> has </a:t>
+            </a:r>
+            <a:r>
+              <a:rPr lang="nl-BE" dirty="0" err="1" smtClean="0"/>
+              <a:t>some</a:t>
+            </a:r>
+            <a:r>
+              <a:rPr lang="nl-BE" dirty="0" smtClean="0"/>
+              <a:t> </a:t>
+            </a:r>
+            <a:r>
+              <a:rPr lang="nl-BE" dirty="0" err="1" smtClean="0"/>
+              <a:t>notes</a:t>
+            </a:r>
+            <a:r>
+              <a:rPr lang="nl-BE" dirty="0" smtClean="0"/>
+              <a:t>.</a:t>
+            </a:r>
+            <a:endParaRPr lang="nl-BE" dirty="0"/>
+          </a:p>
+        </p:txBody>
+      </p:sp>
+      <p:sp>
+        <p:nvSpPr>
+          <p:cNvPr id="4" name="Slide Number Placeholder 3"/>
+          <p:cNvSpPr>
+            <a:spLocks noGrp="1"/>
+          </p:cNvSpPr>
+          <p:nvPr>
+            <p:ph type="sldNum" sz="quarter" idx="10"/>
+          </p:nvPr>
+        </p:nvSpPr>
+        <p:spPr/>
+        <p:txBody>
+          <a:bodyPr/>
+          <a:lstStyle/>
+          <a:p>
+            <a:fld id="{38FEDBC2-E4AF-4493-8E02-4010DC5B5CB7}" type="slidenum">
+              <a:rPr lang="nl-BE" smtClean="0"/>
+              <a:t>1</a:t>
+            </a:fld>
+            <a:endParaRPr lang="nl-BE"/>
+          </a:p>
+        </p:txBody>
+      </p:sp>
+    </p:spTree>
+  </p:cSld>
+  <p:clrMapOvr>
+    <a:masterClrMapping/>
+  </p:clrMapOvr>
+</p:notes>
+</file>
+
+<file path=ppt/notesSlides/notesSlide2.xml><?xml version="1.0" encoding="utf-8"?>
+<p:notes xmlns:a="http://schemas.openxmlformats.org/drawingml/2006/main" xmlns:r="http://schemas.openxmlformats.org/officeDocument/2006/relationships" xmlns:p="http://schemas.openxmlformats.org/presentationml/2006/main">
+  <p:cSld>
+    <p:spTree>
+      <p:nvGrpSpPr>
+        <p:cNvPr id="1" name=""/>
+        <p:cNvGrpSpPr/>
+        <p:nvPr/>
+      </p:nvGrpSpPr>
+      <p:grpSpPr>
+        <a:xfrm>
+          <a:off x="0" y="0"/>
+          <a:ext cx="0" cy="0"/>
+          <a:chOff x="0" y="0"/>
+          <a:chExt cx="0" cy="0"/>
+        </a:xfrm>
+      </p:grpSpPr>
+      <p:sp>
+        <p:nvSpPr>
+          <p:cNvPr id="2" name="Slide Image Placeholder 1"/>
+          <p:cNvSpPr>
+            <a:spLocks noGrp="1" noRot="1" noChangeAspect="1"/>
+          </p:cNvSpPr>
+          <p:nvPr>
+            <p:ph type="sldImg"/>
+          </p:nvPr>
+        </p:nvSpPr>
+        <p:spPr/>
+      </p:sp>
+      <p:sp>
+        <p:nvSpPr>
+          <p:cNvPr id="3" name="Notes Placeholder 2"/>
+          <p:cNvSpPr>
+            <a:spLocks noGrp="1"/>
+          </p:cNvSpPr>
+          <p:nvPr>
+            <p:ph type="body" idx="1"/>
+          </p:nvPr>
+        </p:nvSpPr>
+        <p:spPr/>
+        <p:txBody>
+          <a:bodyPr>
+            <a:normAutofit/>
+          </a:bodyPr>
+          <a:lstStyle/>
+          <a:p>
+            <a:pPr marL="0" marR="0" indent="0" algn="l" defTabSz="914400" rtl="0" eaLnBrk="1" fontAlgn="auto" latinLnBrk="0" hangingPunct="1">
+              <a:lnSpc>
+                <a:spcPct val="100000"/>
+              </a:lnSpc>
+              <a:spcBef>
+                <a:spcPts val="0"/>
+              </a:spcBef>
+              <a:spcAft>
+                <a:spcPts val="0"/>
+              </a:spcAft>
+              <a:buClrTx/>
+              <a:buSzTx/>
+              <a:buFontTx/>
+              <a:buNone/>
+              <a:tabLst/>
+              <a:defRPr/>
+            </a:pPr>
+            <a:r>
+              <a:rPr lang="nl-BE" dirty="0" smtClean="0"/>
+              <a:t>The </a:t>
+            </a:r>
+            <a:r>
+              <a:rPr lang="nl-BE" dirty="0" err="1" smtClean="0"/>
+              <a:t>current</a:t>
+            </a:r>
+            <a:r>
+              <a:rPr lang="nl-BE" dirty="0" smtClean="0"/>
+              <a:t> </a:t>
+            </a:r>
+            <a:r>
+              <a:rPr lang="nl-BE" dirty="0" err="1" smtClean="0"/>
+              <a:t>slide</a:t>
+            </a:r>
+            <a:r>
+              <a:rPr lang="nl-BE" dirty="0" smtClean="0"/>
+              <a:t> </a:t>
+            </a:r>
+            <a:r>
+              <a:rPr lang="nl-BE" dirty="0" err="1" smtClean="0"/>
+              <a:t>also</a:t>
+            </a:r>
+            <a:r>
+              <a:rPr lang="nl-BE" smtClean="0"/>
+              <a:t> has </a:t>
+            </a:r>
+            <a:r>
+              <a:rPr lang="nl-BE" dirty="0" err="1" smtClean="0"/>
+              <a:t>some</a:t>
+            </a:r>
+            <a:r>
+              <a:rPr lang="nl-BE" dirty="0" smtClean="0"/>
+              <a:t> </a:t>
+            </a:r>
+            <a:r>
+              <a:rPr lang="nl-BE" dirty="0" err="1" smtClean="0"/>
+              <a:t>notes</a:t>
+            </a:r>
+            <a:r>
+              <a:rPr lang="nl-BE" dirty="0" smtClean="0"/>
+              <a:t>.</a:t>
+            </a:r>
+          </a:p>
+          <a:p>
+            <a:endParaRPr lang="nl-BE" dirty="0"/>
+          </a:p>
+        </p:txBody>
+      </p:sp>
+      <p:sp>
+        <p:nvSpPr>
+          <p:cNvPr id="4" name="Slide Number Placeholder 3"/>
+          <p:cNvSpPr>
+            <a:spLocks noGrp="1"/>
+          </p:cNvSpPr>
+          <p:nvPr>
+            <p:ph type="sldNum" sz="quarter" idx="10"/>
+          </p:nvPr>
+        </p:nvSpPr>
+        <p:spPr/>
+        <p:txBody>
+          <a:bodyPr/>
+          <a:lstStyle/>
+          <a:p>
+            <a:fld id="{38FEDBC2-E4AF-4493-8E02-4010DC5B5CB7}" type="slidenum">
+              <a:rPr lang="nl-BE" smtClean="0"/>
+              <a:t>3</a:t>
+            </a:fld>
+            <a:endParaRPr lang="nl-BE"/>
+          </a:p>
+        </p:txBody>
+      </p:sp>
+    </p:spTree>
+  </p:cSld>
+  <p:clrMapOvr>
+    <a:masterClrMapping/>
+  </p:clrMapOvr>
+</p:notes>
+</file>
+
 <file path=ppt/slideLayouts/slideLayout1.xml><?xml version="1.0" encoding="utf-8"?>
 <p:sldLayout xmlns:a="http://schemas.openxmlformats.org/drawingml/2006/main" xmlns:r="http://schemas.openxmlformats.org/officeDocument/2006/relationships" xmlns:p="http://schemas.openxmlformats.org/presentationml/2006/main" type="title" preserve="1">
   <p:cSld name="Titeldia">
@@ -290,7 +901,8 @@
           <a:p>
             <a:fld id="{BD586BA1-342D-49D5-90FA-63A461670F86}" type="datetimeFigureOut">
               <a:rPr lang="nl-NL" smtClean="0"/>
-              <a:t>8-10-2008</a:t>
+              <a:pPr/>
+              <a:t>9-10-2008</a:t>
             </a:fld>
             <a:endParaRPr lang="nl-NL"/>
           </a:p>
@@ -332,7 +944,8 @@
           <a:p>
             <a:fld id="{E3929470-23C1-4B67-911A-9209D2397FB5}" type="slidenum">
               <a:rPr lang="nl-NL" smtClean="0"/>
-              <a:t>‹nr.›</a:t>
+              <a:pPr/>
+              <a:t>‹#›</a:t>
             </a:fld>
             <a:endParaRPr lang="nl-NL"/>
           </a:p>
@@ -455,7 +1068,8 @@
           <a:p>
             <a:fld id="{BD586BA1-342D-49D5-90FA-63A461670F86}" type="datetimeFigureOut">
               <a:rPr lang="nl-NL" smtClean="0"/>
-              <a:t>8-10-2008</a:t>
+              <a:pPr/>
+              <a:t>9-10-2008</a:t>
             </a:fld>
             <a:endParaRPr lang="nl-NL"/>
           </a:p>
@@ -497,7 +1111,8 @@
           <a:p>
             <a:fld id="{E3929470-23C1-4B67-911A-9209D2397FB5}" type="slidenum">
               <a:rPr lang="nl-NL" smtClean="0"/>
-              <a:t>‹nr.›</a:t>
+              <a:pPr/>
+              <a:t>‹#›</a:t>
             </a:fld>
             <a:endParaRPr lang="nl-NL"/>
           </a:p>
@@ -630,7 +1245,8 @@
           <a:p>
             <a:fld id="{BD586BA1-342D-49D5-90FA-63A461670F86}" type="datetimeFigureOut">
               <a:rPr lang="nl-NL" smtClean="0"/>
-              <a:t>8-10-2008</a:t>
+              <a:pPr/>
+              <a:t>9-10-2008</a:t>
             </a:fld>
             <a:endParaRPr lang="nl-NL"/>
           </a:p>
@@ -672,7 +1288,8 @@
           <a:p>
             <a:fld id="{E3929470-23C1-4B67-911A-9209D2397FB5}" type="slidenum">
               <a:rPr lang="nl-NL" smtClean="0"/>
-              <a:t>‹nr.›</a:t>
+              <a:pPr/>
+              <a:t>‹#›</a:t>
             </a:fld>
             <a:endParaRPr lang="nl-NL"/>
           </a:p>
@@ -795,7 +1412,8 @@
           <a:p>
             <a:fld id="{BD586BA1-342D-49D5-90FA-63A461670F86}" type="datetimeFigureOut">
               <a:rPr lang="nl-NL" smtClean="0"/>
-              <a:t>8-10-2008</a:t>
+              <a:pPr/>
+              <a:t>9-10-2008</a:t>
             </a:fld>
             <a:endParaRPr lang="nl-NL"/>
           </a:p>
@@ -837,7 +1455,8 @@
           <a:p>
             <a:fld id="{E3929470-23C1-4B67-911A-9209D2397FB5}" type="slidenum">
               <a:rPr lang="nl-NL" smtClean="0"/>
-              <a:t>‹nr.›</a:t>
+              <a:pPr/>
+              <a:t>‹#›</a:t>
             </a:fld>
             <a:endParaRPr lang="nl-NL"/>
           </a:p>
@@ -1036,7 +1655,8 @@
           <a:p>
             <a:fld id="{BD586BA1-342D-49D5-90FA-63A461670F86}" type="datetimeFigureOut">
               <a:rPr lang="nl-NL" smtClean="0"/>
-              <a:t>8-10-2008</a:t>
+              <a:pPr/>
+              <a:t>9-10-2008</a:t>
             </a:fld>
             <a:endParaRPr lang="nl-NL"/>
           </a:p>
@@ -1078,7 +1698,8 @@
           <a:p>
             <a:fld id="{E3929470-23C1-4B67-911A-9209D2397FB5}" type="slidenum">
               <a:rPr lang="nl-NL" smtClean="0"/>
-              <a:t>‹nr.›</a:t>
+              <a:pPr/>
+              <a:t>‹#›</a:t>
             </a:fld>
             <a:endParaRPr lang="nl-NL"/>
           </a:p>
@@ -1319,7 +1940,8 @@
           <a:p>
             <a:fld id="{BD586BA1-342D-49D5-90FA-63A461670F86}" type="datetimeFigureOut">
               <a:rPr lang="nl-NL" smtClean="0"/>
-              <a:t>8-10-2008</a:t>
+              <a:pPr/>
+              <a:t>9-10-2008</a:t>
             </a:fld>
             <a:endParaRPr lang="nl-NL"/>
           </a:p>
@@ -1361,7 +1983,8 @@
           <a:p>
             <a:fld id="{E3929470-23C1-4B67-911A-9209D2397FB5}" type="slidenum">
               <a:rPr lang="nl-NL" smtClean="0"/>
-              <a:t>‹nr.›</a:t>
+              <a:pPr/>
+              <a:t>‹#›</a:t>
             </a:fld>
             <a:endParaRPr lang="nl-NL"/>
           </a:p>
@@ -1736,7 +2359,8 @@
           <a:p>
             <a:fld id="{BD586BA1-342D-49D5-90FA-63A461670F86}" type="datetimeFigureOut">
               <a:rPr lang="nl-NL" smtClean="0"/>
-              <a:t>8-10-2008</a:t>
+              <a:pPr/>
+              <a:t>9-10-2008</a:t>
             </a:fld>
             <a:endParaRPr lang="nl-NL"/>
           </a:p>
@@ -1778,7 +2402,8 @@
           <a:p>
             <a:fld id="{E3929470-23C1-4B67-911A-9209D2397FB5}" type="slidenum">
               <a:rPr lang="nl-NL" smtClean="0"/>
-              <a:t>‹nr.›</a:t>
+              <a:pPr/>
+              <a:t>‹#›</a:t>
             </a:fld>
             <a:endParaRPr lang="nl-NL"/>
           </a:p>
@@ -1849,7 +2474,8 @@
           <a:p>
             <a:fld id="{BD586BA1-342D-49D5-90FA-63A461670F86}" type="datetimeFigureOut">
               <a:rPr lang="nl-NL" smtClean="0"/>
-              <a:t>8-10-2008</a:t>
+              <a:pPr/>
+              <a:t>9-10-2008</a:t>
             </a:fld>
             <a:endParaRPr lang="nl-NL"/>
           </a:p>
@@ -1891,7 +2517,8 @@
           <a:p>
             <a:fld id="{E3929470-23C1-4B67-911A-9209D2397FB5}" type="slidenum">
               <a:rPr lang="nl-NL" smtClean="0"/>
-              <a:t>‹nr.›</a:t>
+              <a:pPr/>
+              <a:t>‹#›</a:t>
             </a:fld>
             <a:endParaRPr lang="nl-NL"/>
           </a:p>
@@ -1939,7 +2566,8 @@
           <a:p>
             <a:fld id="{BD586BA1-342D-49D5-90FA-63A461670F86}" type="datetimeFigureOut">
               <a:rPr lang="nl-NL" smtClean="0"/>
-              <a:t>8-10-2008</a:t>
+              <a:pPr/>
+              <a:t>9-10-2008</a:t>
             </a:fld>
             <a:endParaRPr lang="nl-NL"/>
           </a:p>
@@ -1981,7 +2609,8 @@
           <a:p>
             <a:fld id="{E3929470-23C1-4B67-911A-9209D2397FB5}" type="slidenum">
               <a:rPr lang="nl-NL" smtClean="0"/>
-              <a:t>‹nr.›</a:t>
+              <a:pPr/>
+              <a:t>‹#›</a:t>
             </a:fld>
             <a:endParaRPr lang="nl-NL"/>
           </a:p>
@@ -2211,7 +2840,8 @@
           <a:p>
             <a:fld id="{BD586BA1-342D-49D5-90FA-63A461670F86}" type="datetimeFigureOut">
               <a:rPr lang="nl-NL" smtClean="0"/>
-              <a:t>8-10-2008</a:t>
+              <a:pPr/>
+              <a:t>9-10-2008</a:t>
             </a:fld>
             <a:endParaRPr lang="nl-NL"/>
           </a:p>
@@ -2253,7 +2883,8 @@
           <a:p>
             <a:fld id="{E3929470-23C1-4B67-911A-9209D2397FB5}" type="slidenum">
               <a:rPr lang="nl-NL" smtClean="0"/>
-              <a:t>‹nr.›</a:t>
+              <a:pPr/>
+              <a:t>‹#›</a:t>
             </a:fld>
             <a:endParaRPr lang="nl-NL"/>
           </a:p>
@@ -2459,7 +3090,8 @@
           <a:p>
             <a:fld id="{BD586BA1-342D-49D5-90FA-63A461670F86}" type="datetimeFigureOut">
               <a:rPr lang="nl-NL" smtClean="0"/>
-              <a:t>8-10-2008</a:t>
+              <a:pPr/>
+              <a:t>9-10-2008</a:t>
             </a:fld>
             <a:endParaRPr lang="nl-NL"/>
           </a:p>
@@ -2501,7 +3133,8 @@
           <a:p>
             <a:fld id="{E3929470-23C1-4B67-911A-9209D2397FB5}" type="slidenum">
               <a:rPr lang="nl-NL" smtClean="0"/>
-              <a:t>‹nr.›</a:t>
+              <a:pPr/>
+              <a:t>‹#›</a:t>
             </a:fld>
             <a:endParaRPr lang="nl-NL"/>
           </a:p>
@@ -2667,7 +3300,8 @@
           <a:p>
             <a:fld id="{BD586BA1-342D-49D5-90FA-63A461670F86}" type="datetimeFigureOut">
               <a:rPr lang="nl-NL" smtClean="0"/>
-              <a:t>8-10-2008</a:t>
+              <a:pPr/>
+              <a:t>9-10-2008</a:t>
             </a:fld>
             <a:endParaRPr lang="nl-NL"/>
           </a:p>
@@ -2745,7 +3379,8 @@
           <a:p>
             <a:fld id="{E3929470-23C1-4B67-911A-9209D2397FB5}" type="slidenum">
               <a:rPr lang="nl-NL" smtClean="0"/>
-              <a:t>‹nr.›</a:t>
+              <a:pPr/>
+              <a:t>‹#›</a:t>
             </a:fld>
             <a:endParaRPr lang="nl-NL"/>
           </a:p>
@@ -3583,4 +4218,287 @@
   <a:objectDefaults/>
   <a:extraClrSchemeLst/>
 </a:theme>
+</file>
+
+<file path=ppt/theme/theme2.xml><?xml version="1.0" encoding="utf-8"?>
+<a:theme xmlns:a="http://schemas.openxmlformats.org/drawingml/2006/main" name="Office Theme">
+  <a:themeElements>
+    <a:clrScheme name="Office">
+      <a:dk1>
+        <a:sysClr val="windowText" lastClr="000000"/>
+      </a:dk1>
+      <a:lt1>
+        <a:sysClr val="window" lastClr="FFFFFF"/>
+      </a:lt1>
+      <a:dk2>
+        <a:srgbClr val="1F497D"/>
+      </a:dk2>
+      <a:lt2>
+        <a:srgbClr val="EEECE1"/>
+      </a:lt2>
+      <a:accent1>
+        <a:srgbClr val="4F81BD"/>
+      </a:accent1>
+      <a:accent2>
+        <a:srgbClr val="C0504D"/>
+      </a:accent2>
+      <a:accent3>
+        <a:srgbClr val="9BBB59"/>
+      </a:accent3>
+      <a:accent4>
+        <a:srgbClr val="8064A2"/>
+      </a:accent4>
+      <a:accent5>
+        <a:srgbClr val="4BACC6"/>
+      </a:accent5>
+      <a:accent6>
+        <a:srgbClr val="F79646"/>
+      </a:accent6>
+      <a:hlink>
+        <a:srgbClr val="0000FF"/>
+      </a:hlink>
+      <a:folHlink>
+        <a:srgbClr val="800080"/>
+      </a:folHlink>
+    </a:clrScheme>
+    <a:fontScheme name="Office">
+      <a:majorFont>
+        <a:latin typeface="Calibri"/>
+        <a:ea typeface=""/>
+        <a:cs typeface=""/>
+        <a:font script="Jpan" typeface="ＭＳ Ｐゴシック"/>
+        <a:font script="Hang" typeface="맑은 고딕"/>
+        <a:font script="Hans" typeface="宋体"/>
+        <a:font script="Hant" typeface="新細明體"/>
+        <a:font script="Arab" typeface="Times New Roman"/>
+        <a:font script="Hebr" typeface="Times New Roman"/>
+        <a:font script="Thai" typeface="Angsana New"/>
+        <a:font script="Ethi" typeface="Nyala"/>
+        <a:font script="Beng" typeface="Vrinda"/>
+        <a:font script="Gujr" typeface="Shruti"/>
+        <a:font script="Khmr" typeface="MoolBoran"/>
+        <a:font script="Knda" typeface="Tunga"/>
+        <a:font script="Guru" typeface="Raavi"/>
+        <a:font script="Cans" typeface="Euphemia"/>
+        <a:font script="Cher" typeface="Plantagenet Cherokee"/>
+        <a:font script="Yiii" typeface="Microsoft Yi Baiti"/>
+        <a:font script="Tibt" typeface="Microsoft Himalaya"/>
+        <a:font script="Thaa" typeface="MV Boli"/>
+        <a:font script="Deva" typeface="Mangal"/>
+        <a:font script="Telu" typeface="Gautami"/>
+        <a:font script="Taml" typeface="Latha"/>
+        <a:font script="Syrc" typeface="Estrangelo Edessa"/>
+        <a:font script="Orya" typeface="Kalinga"/>
+        <a:font script="Mlym" typeface="Kartika"/>
+        <a:font script="Laoo" typeface="DokChampa"/>
+        <a:font script="Sinh" typeface="Iskoola Pota"/>
+        <a:font script="Mong" typeface="Mongolian Baiti"/>
+        <a:font script="Viet" typeface="Times New Roman"/>
+        <a:font script="Uigh" typeface="Microsoft Uighur"/>
+      </a:majorFont>
+      <a:minorFont>
+        <a:latin typeface="Calibri"/>
+        <a:ea typeface=""/>
+        <a:cs typeface=""/>
+        <a:font script="Jpan" typeface="ＭＳ Ｐゴシック"/>
+        <a:font script="Hang" typeface="맑은 고딕"/>
+        <a:font script="Hans" typeface="宋体"/>
+        <a:font script="Hant" typeface="新細明體"/>
+        <a:font script="Arab" typeface="Arial"/>
+        <a:font script="Hebr" typeface="Arial"/>
+        <a:font script="Thai" typeface="Cordia New"/>
+        <a:font script="Ethi" typeface="Nyala"/>
+        <a:font script="Beng" typeface="Vrinda"/>
+        <a:font script="Gujr" typeface="Shruti"/>
+        <a:font script="Khmr" typeface="DaunPenh"/>
+        <a:font script="Knda" typeface="Tunga"/>
+        <a:font script="Guru" typeface="Raavi"/>
+        <a:font script="Cans" typeface="Euphemia"/>
+        <a:font script="Cher" typeface="Plantagenet Cherokee"/>
+        <a:font script="Yiii" typeface="Microsoft Yi Baiti"/>
+        <a:font script="Tibt" typeface="Microsoft Himalaya"/>
+        <a:font script="Thaa" typeface="MV Boli"/>
+        <a:font script="Deva" typeface="Mangal"/>
+        <a:font script="Telu" typeface="Gautami"/>
+        <a:font script="Taml" typeface="Latha"/>
+        <a:font script="Syrc" typeface="Estrangelo Edessa"/>
+        <a:font script="Orya" typeface="Kalinga"/>
+        <a:font script="Mlym" typeface="Kartika"/>
+        <a:font script="Laoo" typeface="DokChampa"/>
+        <a:font script="Sinh" typeface="Iskoola Pota"/>
+        <a:font script="Mong" typeface="Mongolian Baiti"/>
+        <a:font script="Viet" typeface="Arial"/>
+        <a:font script="Uigh" typeface="Microsoft Uighur"/>
+      </a:minorFont>
+    </a:fontScheme>
+    <a:fmtScheme name="Office">
+      <a:fillStyleLst>
+        <a:solidFill>
+          <a:schemeClr val="phClr"/>
+        </a:solidFill>
+        <a:gradFill rotWithShape="1">
+          <a:gsLst>
+            <a:gs pos="0">
+              <a:schemeClr val="phClr">
+                <a:tint val="50000"/>
+                <a:satMod val="300000"/>
+              </a:schemeClr>
+            </a:gs>
+            <a:gs pos="35000">
+              <a:schemeClr val="phClr">
+                <a:tint val="37000"/>
+                <a:satMod val="300000"/>
+              </a:schemeClr>
+            </a:gs>
+            <a:gs pos="100000">
+              <a:schemeClr val="phClr">
+                <a:tint val="15000"/>
+                <a:satMod val="350000"/>
+              </a:schemeClr>
+            </a:gs>
+          </a:gsLst>
+          <a:lin ang="16200000" scaled="1"/>
+        </a:gradFill>
+        <a:gradFill rotWithShape="1">
+          <a:gsLst>
+            <a:gs pos="0">
+              <a:schemeClr val="phClr">
+                <a:shade val="51000"/>
+                <a:satMod val="130000"/>
+              </a:schemeClr>
+            </a:gs>
+            <a:gs pos="80000">
+              <a:schemeClr val="phClr">
+                <a:shade val="93000"/>
+                <a:satMod val="130000"/>
+              </a:schemeClr>
+            </a:gs>
+            <a:gs pos="100000">
+              <a:schemeClr val="phClr">
+                <a:shade val="94000"/>
+                <a:satMod val="135000"/>
+              </a:schemeClr>
+            </a:gs>
+          </a:gsLst>
+          <a:lin ang="16200000" scaled="0"/>
+        </a:gradFill>
+      </a:fillStyleLst>
+      <a:lnStyleLst>
+        <a:ln w="9525" cap="flat" cmpd="sng" algn="ctr">
+          <a:solidFill>
+            <a:schemeClr val="phClr">
+              <a:shade val="95000"/>
+              <a:satMod val="105000"/>
+            </a:schemeClr>
+          </a:solidFill>
+          <a:prstDash val="solid"/>
+        </a:ln>
+        <a:ln w="25400" cap="flat" cmpd="sng" algn="ctr">
+          <a:solidFill>
+            <a:schemeClr val="phClr"/>
+          </a:solidFill>
+          <a:prstDash val="solid"/>
+        </a:ln>
+        <a:ln w="38100" cap="flat" cmpd="sng" algn="ctr">
+          <a:solidFill>
+            <a:schemeClr val="phClr"/>
+          </a:solidFill>
+          <a:prstDash val="solid"/>
+        </a:ln>
+      </a:lnStyleLst>
+      <a:effectStyleLst>
+        <a:effectStyle>
+          <a:effectLst>
+            <a:outerShdw blurRad="40000" dist="20000" dir="5400000" rotWithShape="0">
+              <a:srgbClr val="000000">
+                <a:alpha val="38000"/>
+              </a:srgbClr>
+            </a:outerShdw>
+          </a:effectLst>
+        </a:effectStyle>
+        <a:effectStyle>
+          <a:effectLst>
+            <a:outerShdw blurRad="40000" dist="23000" dir="5400000" rotWithShape="0">
+              <a:srgbClr val="000000">
+                <a:alpha val="35000"/>
+              </a:srgbClr>
+            </a:outerShdw>
+          </a:effectLst>
+        </a:effectStyle>
+        <a:effectStyle>
+          <a:effectLst>
+            <a:outerShdw blurRad="40000" dist="23000" dir="5400000" rotWithShape="0">
+              <a:srgbClr val="000000">
+                <a:alpha val="35000"/>
+              </a:srgbClr>
+            </a:outerShdw>
+          </a:effectLst>
+          <a:scene3d>
+            <a:camera prst="orthographicFront">
+              <a:rot lat="0" lon="0" rev="0"/>
+            </a:camera>
+            <a:lightRig rig="threePt" dir="t">
+              <a:rot lat="0" lon="0" rev="1200000"/>
+            </a:lightRig>
+          </a:scene3d>
+          <a:sp3d>
+            <a:bevelT w="63500" h="25400"/>
+          </a:sp3d>
+        </a:effectStyle>
+      </a:effectStyleLst>
+      <a:bgFillStyleLst>
+        <a:solidFill>
+          <a:schemeClr val="phClr"/>
+        </a:solidFill>
+        <a:gradFill rotWithShape="1">
+          <a:gsLst>
+            <a:gs pos="0">
+              <a:schemeClr val="phClr">
+                <a:tint val="40000"/>
+                <a:satMod val="350000"/>
+              </a:schemeClr>
+            </a:gs>
+            <a:gs pos="40000">
+              <a:schemeClr val="phClr">
+                <a:tint val="45000"/>
+                <a:shade val="99000"/>
+                <a:satMod val="350000"/>
+              </a:schemeClr>
+            </a:gs>
+            <a:gs pos="100000">
+              <a:schemeClr val="phClr">
+                <a:shade val="20000"/>
+                <a:satMod val="255000"/>
+              </a:schemeClr>
+            </a:gs>
+          </a:gsLst>
+          <a:path path="circle">
+            <a:fillToRect l="50000" t="-80000" r="50000" b="180000"/>
+          </a:path>
+        </a:gradFill>
+        <a:gradFill rotWithShape="1">
+          <a:gsLst>
+            <a:gs pos="0">
+              <a:schemeClr val="phClr">
+                <a:tint val="80000"/>
+                <a:satMod val="300000"/>
+              </a:schemeClr>
+            </a:gs>
+            <a:gs pos="100000">
+              <a:schemeClr val="phClr">
+                <a:shade val="30000"/>
+                <a:satMod val="200000"/>
+              </a:schemeClr>
+            </a:gs>
+          </a:gsLst>
+          <a:path path="circle">
+            <a:fillToRect l="50000" t="50000" r="50000" b="50000"/>
+          </a:path>
+        </a:gradFill>
+      </a:bgFillStyleLst>
+    </a:fmtScheme>
+  </a:themeElements>
+  <a:objectDefaults/>
+  <a:extraClrSchemeLst/>
+</a:theme>
 </file>
</xml_diff>